<commit_message>
PPT and Assignment Updated
</commit_message>
<xml_diff>
--- a/Notes/Presentation.pptx
+++ b/Notes/Presentation.pptx
@@ -5,7 +5,7 @@
     <p:sldMasterId id="2147483648" r:id="rId1"/>
   </p:sldMasterIdLst>
   <p:notesMasterIdLst>
-    <p:notesMasterId r:id="rId17"/>
+    <p:notesMasterId r:id="rId19"/>
   </p:notesMasterIdLst>
   <p:sldIdLst>
     <p:sldId id="256" r:id="rId2"/>
@@ -23,6 +23,8 @@
     <p:sldId id="320" r:id="rId14"/>
     <p:sldId id="463" r:id="rId15"/>
     <p:sldId id="464" r:id="rId16"/>
+    <p:sldId id="465" r:id="rId17"/>
+    <p:sldId id="340" r:id="rId18"/>
   </p:sldIdLst>
   <p:sldSz cx="12192000" cy="6858000"/>
   <p:notesSz cx="6858000" cy="9144000"/>
@@ -6937,6 +6939,580 @@
     <p:extLst>
       <p:ext uri="{BB962C8B-B14F-4D97-AF65-F5344CB8AC3E}">
         <p14:creationId xmlns:p14="http://schemas.microsoft.com/office/powerpoint/2010/main" val="3995832499"/>
+      </p:ext>
+    </p:extLst>
+  </p:cSld>
+  <p:clrMapOvr>
+    <a:masterClrMapping/>
+  </p:clrMapOvr>
+</p:sld>
+</file>
+
+<file path=ppt/slides/slide16.xml><?xml version="1.0" encoding="utf-8"?>
+<p:sld xmlns:a="http://schemas.openxmlformats.org/drawingml/2006/main" xmlns:r="http://schemas.openxmlformats.org/officeDocument/2006/relationships" xmlns:p="http://schemas.openxmlformats.org/presentationml/2006/main">
+  <p:cSld>
+    <p:spTree>
+      <p:nvGrpSpPr>
+        <p:cNvPr id="1" name=""/>
+        <p:cNvGrpSpPr/>
+        <p:nvPr/>
+      </p:nvGrpSpPr>
+      <p:grpSpPr>
+        <a:xfrm>
+          <a:off x="0" y="0"/>
+          <a:ext cx="0" cy="0"/>
+          <a:chOff x="0" y="0"/>
+          <a:chExt cx="0" cy="0"/>
+        </a:xfrm>
+      </p:grpSpPr>
+      <p:sp>
+        <p:nvSpPr>
+          <p:cNvPr id="4" name="Rectangle: Rounded Corners 3">
+            <a:extLst>
+              <a:ext uri="{FF2B5EF4-FFF2-40B4-BE49-F238E27FC236}">
+                <a16:creationId xmlns:a16="http://schemas.microsoft.com/office/drawing/2014/main" id="{B48CCF95-BEF5-F323-91D8-19D40DB794CB}"/>
+              </a:ext>
+            </a:extLst>
+          </p:cNvPr>
+          <p:cNvSpPr/>
+          <p:nvPr/>
+        </p:nvSpPr>
+        <p:spPr>
+          <a:xfrm>
+            <a:off x="5159141" y="1097280"/>
+            <a:ext cx="2646947" cy="3388093"/>
+          </a:xfrm>
+          <a:prstGeom prst="roundRect">
+            <a:avLst/>
+          </a:prstGeom>
+        </p:spPr>
+        <p:style>
+          <a:lnRef idx="2">
+            <a:schemeClr val="accent1">
+              <a:shade val="15000"/>
+            </a:schemeClr>
+          </a:lnRef>
+          <a:fillRef idx="1">
+            <a:schemeClr val="accent1"/>
+          </a:fillRef>
+          <a:effectRef idx="0">
+            <a:schemeClr val="accent1"/>
+          </a:effectRef>
+          <a:fontRef idx="minor">
+            <a:schemeClr val="lt1"/>
+          </a:fontRef>
+        </p:style>
+        <p:txBody>
+          <a:bodyPr rtlCol="0" anchor="ctr"/>
+          <a:lstStyle/>
+          <a:p>
+            <a:pPr algn="ctr"/>
+            <a:r>
+              <a:rPr lang="en-US" dirty="0"/>
+              <a:t>NEXT SERVER</a:t>
+            </a:r>
+            <a:endParaRPr lang="en-IN" dirty="0"/>
+          </a:p>
+        </p:txBody>
+      </p:sp>
+      <p:sp>
+        <p:nvSpPr>
+          <p:cNvPr id="5" name="Rectangle 4">
+            <a:extLst>
+              <a:ext uri="{FF2B5EF4-FFF2-40B4-BE49-F238E27FC236}">
+                <a16:creationId xmlns:a16="http://schemas.microsoft.com/office/drawing/2014/main" id="{03B33B9D-8448-CF84-6B02-6442792F2F50}"/>
+              </a:ext>
+            </a:extLst>
+          </p:cNvPr>
+          <p:cNvSpPr/>
+          <p:nvPr/>
+        </p:nvSpPr>
+        <p:spPr>
+          <a:xfrm>
+            <a:off x="375385" y="1357162"/>
+            <a:ext cx="2444817" cy="2868328"/>
+          </a:xfrm>
+          <a:prstGeom prst="rect">
+            <a:avLst/>
+          </a:prstGeom>
+        </p:spPr>
+        <p:style>
+          <a:lnRef idx="2">
+            <a:schemeClr val="accent1">
+              <a:shade val="15000"/>
+            </a:schemeClr>
+          </a:lnRef>
+          <a:fillRef idx="1">
+            <a:schemeClr val="accent1"/>
+          </a:fillRef>
+          <a:effectRef idx="0">
+            <a:schemeClr val="accent1"/>
+          </a:effectRef>
+          <a:fontRef idx="minor">
+            <a:schemeClr val="lt1"/>
+          </a:fontRef>
+        </p:style>
+        <p:txBody>
+          <a:bodyPr rtlCol="0" anchor="ctr"/>
+          <a:lstStyle/>
+          <a:p>
+            <a:pPr algn="ctr"/>
+            <a:r>
+              <a:rPr lang="en-US" dirty="0"/>
+              <a:t>BROWSER</a:t>
+            </a:r>
+            <a:endParaRPr lang="en-IN" dirty="0"/>
+          </a:p>
+        </p:txBody>
+      </p:sp>
+      <p:cxnSp>
+        <p:nvCxnSpPr>
+          <p:cNvPr id="7" name="Straight Arrow Connector 6">
+            <a:extLst>
+              <a:ext uri="{FF2B5EF4-FFF2-40B4-BE49-F238E27FC236}">
+                <a16:creationId xmlns:a16="http://schemas.microsoft.com/office/drawing/2014/main" id="{285B7170-AE8F-F1EB-35E9-71D72E4F46B4}"/>
+              </a:ext>
+            </a:extLst>
+          </p:cNvPr>
+          <p:cNvCxnSpPr/>
+          <p:nvPr/>
+        </p:nvCxnSpPr>
+        <p:spPr>
+          <a:xfrm>
+            <a:off x="2820202" y="2011680"/>
+            <a:ext cx="2338939" cy="0"/>
+          </a:xfrm>
+          <a:prstGeom prst="straightConnector1">
+            <a:avLst/>
+          </a:prstGeom>
+          <a:ln>
+            <a:tailEnd type="triangle"/>
+          </a:ln>
+        </p:spPr>
+        <p:style>
+          <a:lnRef idx="2">
+            <a:schemeClr val="accent1"/>
+          </a:lnRef>
+          <a:fillRef idx="0">
+            <a:schemeClr val="accent1"/>
+          </a:fillRef>
+          <a:effectRef idx="1">
+            <a:schemeClr val="accent1"/>
+          </a:effectRef>
+          <a:fontRef idx="minor">
+            <a:schemeClr val="tx1"/>
+          </a:fontRef>
+        </p:style>
+      </p:cxnSp>
+      <p:sp>
+        <p:nvSpPr>
+          <p:cNvPr id="8" name="TextBox 7">
+            <a:extLst>
+              <a:ext uri="{FF2B5EF4-FFF2-40B4-BE49-F238E27FC236}">
+                <a16:creationId xmlns:a16="http://schemas.microsoft.com/office/drawing/2014/main" id="{D2291B08-FDB7-3775-82F9-5D7B86EA43A2}"/>
+              </a:ext>
+            </a:extLst>
+          </p:cNvPr>
+          <p:cNvSpPr txBox="1"/>
+          <p:nvPr/>
+        </p:nvSpPr>
+        <p:spPr>
+          <a:xfrm>
+            <a:off x="1790203" y="1001376"/>
+            <a:ext cx="3500125" cy="307777"/>
+          </a:xfrm>
+          <a:prstGeom prst="rect">
+            <a:avLst/>
+          </a:prstGeom>
+          <a:noFill/>
+        </p:spPr>
+        <p:txBody>
+          <a:bodyPr wrap="none" rtlCol="0">
+            <a:spAutoFit/>
+          </a:bodyPr>
+          <a:lstStyle/>
+          <a:p>
+            <a:r>
+              <a:rPr lang="en-US" sz="1400" dirty="0"/>
+              <a:t>http://localhost:3000/conference/sessions</a:t>
+            </a:r>
+            <a:endParaRPr lang="en-IN" sz="1400" dirty="0"/>
+          </a:p>
+        </p:txBody>
+      </p:sp>
+      <p:cxnSp>
+        <p:nvCxnSpPr>
+          <p:cNvPr id="10" name="Straight Arrow Connector 9">
+            <a:extLst>
+              <a:ext uri="{FF2B5EF4-FFF2-40B4-BE49-F238E27FC236}">
+                <a16:creationId xmlns:a16="http://schemas.microsoft.com/office/drawing/2014/main" id="{58EF73BF-EE86-775D-6B23-E684DA47DAC0}"/>
+              </a:ext>
+            </a:extLst>
+          </p:cNvPr>
+          <p:cNvCxnSpPr/>
+          <p:nvPr/>
+        </p:nvCxnSpPr>
+        <p:spPr>
+          <a:xfrm flipH="1">
+            <a:off x="2820202" y="2396691"/>
+            <a:ext cx="2338939" cy="0"/>
+          </a:xfrm>
+          <a:prstGeom prst="straightConnector1">
+            <a:avLst/>
+          </a:prstGeom>
+          <a:ln>
+            <a:tailEnd type="triangle"/>
+          </a:ln>
+        </p:spPr>
+        <p:style>
+          <a:lnRef idx="2">
+            <a:schemeClr val="accent1"/>
+          </a:lnRef>
+          <a:fillRef idx="0">
+            <a:schemeClr val="accent1"/>
+          </a:fillRef>
+          <a:effectRef idx="1">
+            <a:schemeClr val="accent1"/>
+          </a:effectRef>
+          <a:fontRef idx="minor">
+            <a:schemeClr val="tx1"/>
+          </a:fontRef>
+        </p:style>
+      </p:cxnSp>
+      <p:sp>
+        <p:nvSpPr>
+          <p:cNvPr id="11" name="TextBox 10">
+            <a:extLst>
+              <a:ext uri="{FF2B5EF4-FFF2-40B4-BE49-F238E27FC236}">
+                <a16:creationId xmlns:a16="http://schemas.microsoft.com/office/drawing/2014/main" id="{3767D7DB-4136-70AE-CFA8-717FE0D63ED8}"/>
+              </a:ext>
+            </a:extLst>
+          </p:cNvPr>
+          <p:cNvSpPr txBox="1"/>
+          <p:nvPr/>
+        </p:nvSpPr>
+        <p:spPr>
+          <a:xfrm>
+            <a:off x="3675321" y="2396691"/>
+            <a:ext cx="628698" cy="307777"/>
+          </a:xfrm>
+          <a:prstGeom prst="rect">
+            <a:avLst/>
+          </a:prstGeom>
+          <a:noFill/>
+        </p:spPr>
+        <p:txBody>
+          <a:bodyPr wrap="none" rtlCol="0">
+            <a:spAutoFit/>
+          </a:bodyPr>
+          <a:lstStyle/>
+          <a:p>
+            <a:r>
+              <a:rPr lang="en-US" sz="1400" dirty="0"/>
+              <a:t>HTML</a:t>
+            </a:r>
+            <a:endParaRPr lang="en-IN" sz="1400" dirty="0"/>
+          </a:p>
+        </p:txBody>
+      </p:sp>
+      <p:sp>
+        <p:nvSpPr>
+          <p:cNvPr id="12" name="Rectangle 11">
+            <a:extLst>
+              <a:ext uri="{FF2B5EF4-FFF2-40B4-BE49-F238E27FC236}">
+                <a16:creationId xmlns:a16="http://schemas.microsoft.com/office/drawing/2014/main" id="{779F699E-97BC-92D6-21CB-24884AB49157}"/>
+              </a:ext>
+            </a:extLst>
+          </p:cNvPr>
+          <p:cNvSpPr/>
+          <p:nvPr/>
+        </p:nvSpPr>
+        <p:spPr>
+          <a:xfrm>
+            <a:off x="9371798" y="1669752"/>
+            <a:ext cx="1703672" cy="2069432"/>
+          </a:xfrm>
+          <a:prstGeom prst="rect">
+            <a:avLst/>
+          </a:prstGeom>
+        </p:spPr>
+        <p:style>
+          <a:lnRef idx="2">
+            <a:schemeClr val="accent1">
+              <a:shade val="15000"/>
+            </a:schemeClr>
+          </a:lnRef>
+          <a:fillRef idx="1">
+            <a:schemeClr val="accent1"/>
+          </a:fillRef>
+          <a:effectRef idx="0">
+            <a:schemeClr val="accent1"/>
+          </a:effectRef>
+          <a:fontRef idx="minor">
+            <a:schemeClr val="lt1"/>
+          </a:fontRef>
+        </p:style>
+        <p:txBody>
+          <a:bodyPr rtlCol="0" anchor="ctr"/>
+          <a:lstStyle/>
+          <a:p>
+            <a:pPr algn="ctr"/>
+            <a:r>
+              <a:rPr lang="en-US" dirty="0"/>
+              <a:t>API SERVER</a:t>
+            </a:r>
+            <a:endParaRPr lang="en-IN" dirty="0"/>
+          </a:p>
+        </p:txBody>
+      </p:sp>
+      <p:cxnSp>
+        <p:nvCxnSpPr>
+          <p:cNvPr id="14" name="Straight Arrow Connector 13">
+            <a:extLst>
+              <a:ext uri="{FF2B5EF4-FFF2-40B4-BE49-F238E27FC236}">
+                <a16:creationId xmlns:a16="http://schemas.microsoft.com/office/drawing/2014/main" id="{9241FA11-92A4-EBE2-C93F-8E89B02B4B54}"/>
+              </a:ext>
+            </a:extLst>
+          </p:cNvPr>
+          <p:cNvCxnSpPr/>
+          <p:nvPr/>
+        </p:nvCxnSpPr>
+        <p:spPr>
+          <a:xfrm>
+            <a:off x="7806088" y="2281187"/>
+            <a:ext cx="1565710" cy="0"/>
+          </a:xfrm>
+          <a:prstGeom prst="straightConnector1">
+            <a:avLst/>
+          </a:prstGeom>
+          <a:ln>
+            <a:tailEnd type="triangle"/>
+          </a:ln>
+        </p:spPr>
+        <p:style>
+          <a:lnRef idx="2">
+            <a:schemeClr val="accent1"/>
+          </a:lnRef>
+          <a:fillRef idx="0">
+            <a:schemeClr val="accent1"/>
+          </a:fillRef>
+          <a:effectRef idx="1">
+            <a:schemeClr val="accent1"/>
+          </a:effectRef>
+          <a:fontRef idx="minor">
+            <a:schemeClr val="tx1"/>
+          </a:fontRef>
+        </p:style>
+      </p:cxnSp>
+      <p:cxnSp>
+        <p:nvCxnSpPr>
+          <p:cNvPr id="16" name="Straight Arrow Connector 15">
+            <a:extLst>
+              <a:ext uri="{FF2B5EF4-FFF2-40B4-BE49-F238E27FC236}">
+                <a16:creationId xmlns:a16="http://schemas.microsoft.com/office/drawing/2014/main" id="{33524C89-C73C-1807-EB6C-F7588A2BE9FC}"/>
+              </a:ext>
+            </a:extLst>
+          </p:cNvPr>
+          <p:cNvCxnSpPr/>
+          <p:nvPr/>
+        </p:nvCxnSpPr>
+        <p:spPr>
+          <a:xfrm flipH="1">
+            <a:off x="7806088" y="3012707"/>
+            <a:ext cx="1565710" cy="0"/>
+          </a:xfrm>
+          <a:prstGeom prst="straightConnector1">
+            <a:avLst/>
+          </a:prstGeom>
+          <a:ln>
+            <a:tailEnd type="triangle"/>
+          </a:ln>
+        </p:spPr>
+        <p:style>
+          <a:lnRef idx="2">
+            <a:schemeClr val="accent1"/>
+          </a:lnRef>
+          <a:fillRef idx="0">
+            <a:schemeClr val="accent1"/>
+          </a:fillRef>
+          <a:effectRef idx="1">
+            <a:schemeClr val="accent1"/>
+          </a:effectRef>
+          <a:fontRef idx="minor">
+            <a:schemeClr val="tx1"/>
+          </a:fontRef>
+        </p:style>
+      </p:cxnSp>
+      <p:sp>
+        <p:nvSpPr>
+          <p:cNvPr id="17" name="TextBox 16">
+            <a:extLst>
+              <a:ext uri="{FF2B5EF4-FFF2-40B4-BE49-F238E27FC236}">
+                <a16:creationId xmlns:a16="http://schemas.microsoft.com/office/drawing/2014/main" id="{53F9F22B-97BC-8570-E3DA-83C2D03D1CB8}"/>
+              </a:ext>
+            </a:extLst>
+          </p:cNvPr>
+          <p:cNvSpPr txBox="1"/>
+          <p:nvPr/>
+        </p:nvSpPr>
+        <p:spPr>
+          <a:xfrm>
+            <a:off x="7806088" y="1266128"/>
+            <a:ext cx="2569871" cy="307777"/>
+          </a:xfrm>
+          <a:prstGeom prst="rect">
+            <a:avLst/>
+          </a:prstGeom>
+          <a:noFill/>
+        </p:spPr>
+        <p:txBody>
+          <a:bodyPr wrap="none" rtlCol="0">
+            <a:spAutoFit/>
+          </a:bodyPr>
+          <a:lstStyle/>
+          <a:p>
+            <a:r>
+              <a:rPr lang="en-US" sz="1400" dirty="0"/>
+              <a:t>http://localhost:8001/sessions</a:t>
+            </a:r>
+            <a:endParaRPr lang="en-IN" sz="1400" dirty="0"/>
+          </a:p>
+        </p:txBody>
+      </p:sp>
+      <p:sp>
+        <p:nvSpPr>
+          <p:cNvPr id="18" name="TextBox 17">
+            <a:extLst>
+              <a:ext uri="{FF2B5EF4-FFF2-40B4-BE49-F238E27FC236}">
+                <a16:creationId xmlns:a16="http://schemas.microsoft.com/office/drawing/2014/main" id="{BFFAC868-DE86-5BBB-3440-F5B3E8B5504D}"/>
+              </a:ext>
+            </a:extLst>
+          </p:cNvPr>
+          <p:cNvSpPr txBox="1"/>
+          <p:nvPr/>
+        </p:nvSpPr>
+        <p:spPr>
+          <a:xfrm>
+            <a:off x="8287418" y="3012707"/>
+            <a:ext cx="603050" cy="307777"/>
+          </a:xfrm>
+          <a:prstGeom prst="rect">
+            <a:avLst/>
+          </a:prstGeom>
+          <a:noFill/>
+        </p:spPr>
+        <p:txBody>
+          <a:bodyPr wrap="none" rtlCol="0">
+            <a:spAutoFit/>
+          </a:bodyPr>
+          <a:lstStyle/>
+          <a:p>
+            <a:r>
+              <a:rPr lang="en-US" sz="1400" dirty="0"/>
+              <a:t>JSON</a:t>
+            </a:r>
+            <a:endParaRPr lang="en-IN" sz="1400" dirty="0"/>
+          </a:p>
+        </p:txBody>
+      </p:sp>
+    </p:spTree>
+    <p:extLst>
+      <p:ext uri="{BB962C8B-B14F-4D97-AF65-F5344CB8AC3E}">
+        <p14:creationId xmlns:p14="http://schemas.microsoft.com/office/powerpoint/2010/main" val="3318166285"/>
+      </p:ext>
+    </p:extLst>
+  </p:cSld>
+  <p:clrMapOvr>
+    <a:masterClrMapping/>
+  </p:clrMapOvr>
+</p:sld>
+</file>
+
+<file path=ppt/slides/slide17.xml><?xml version="1.0" encoding="utf-8"?>
+<p:sld xmlns:a="http://schemas.openxmlformats.org/drawingml/2006/main" xmlns:r="http://schemas.openxmlformats.org/officeDocument/2006/relationships" xmlns:p="http://schemas.openxmlformats.org/presentationml/2006/main">
+  <p:cSld>
+    <p:spTree>
+      <p:nvGrpSpPr>
+        <p:cNvPr id="1" name=""/>
+        <p:cNvGrpSpPr/>
+        <p:nvPr/>
+      </p:nvGrpSpPr>
+      <p:grpSpPr>
+        <a:xfrm>
+          <a:off x="0" y="0"/>
+          <a:ext cx="0" cy="0"/>
+          <a:chOff x="0" y="0"/>
+          <a:chExt cx="0" cy="0"/>
+        </a:xfrm>
+      </p:grpSpPr>
+      <p:sp>
+        <p:nvSpPr>
+          <p:cNvPr id="2" name="Title 1">
+            <a:extLst>
+              <a:ext uri="{FF2B5EF4-FFF2-40B4-BE49-F238E27FC236}">
+                <a16:creationId xmlns:a16="http://schemas.microsoft.com/office/drawing/2014/main" id="{4158C489-52BE-4B37-B045-E4AEE2EEB5B4}"/>
+              </a:ext>
+            </a:extLst>
+          </p:cNvPr>
+          <p:cNvSpPr>
+            <a:spLocks noGrp="1"/>
+          </p:cNvSpPr>
+          <p:nvPr>
+            <p:ph type="title"/>
+          </p:nvPr>
+        </p:nvSpPr>
+        <p:spPr/>
+        <p:txBody>
+          <a:bodyPr/>
+          <a:lstStyle/>
+          <a:p>
+            <a:r>
+              <a:rPr lang="en-US" dirty="0"/>
+              <a:t>Assignment</a:t>
+            </a:r>
+            <a:endParaRPr lang="en-IN" dirty="0"/>
+          </a:p>
+        </p:txBody>
+      </p:sp>
+      <p:pic>
+        <p:nvPicPr>
+          <p:cNvPr id="5" name="Content Placeholder 4" descr="Graphical user interface, application&#10;&#10;Description automatically generated">
+            <a:extLst>
+              <a:ext uri="{FF2B5EF4-FFF2-40B4-BE49-F238E27FC236}">
+                <a16:creationId xmlns:a16="http://schemas.microsoft.com/office/drawing/2014/main" id="{70317B35-51A4-40C6-BFB6-FF878C11EC8D}"/>
+              </a:ext>
+            </a:extLst>
+          </p:cNvPr>
+          <p:cNvPicPr>
+            <a:picLocks noGrp="1" noChangeAspect="1"/>
+          </p:cNvPicPr>
+          <p:nvPr>
+            <p:ph idx="1"/>
+          </p:nvPr>
+        </p:nvPicPr>
+        <p:blipFill>
+          <a:blip r:embed="rId2">
+            <a:extLst>
+              <a:ext uri="{28A0092B-C50C-407E-A947-70E740481C1C}">
+                <a14:useLocalDpi xmlns:a14="http://schemas.microsoft.com/office/drawing/2010/main" val="0"/>
+              </a:ext>
+            </a:extLst>
+          </a:blip>
+          <a:stretch>
+            <a:fillRect/>
+          </a:stretch>
+        </p:blipFill>
+        <p:spPr>
+          <a:xfrm>
+            <a:off x="2399929" y="1681734"/>
+            <a:ext cx="7392142" cy="4639120"/>
+          </a:xfrm>
+        </p:spPr>
+      </p:pic>
+    </p:spTree>
+    <p:extLst>
+      <p:ext uri="{BB962C8B-B14F-4D97-AF65-F5344CB8AC3E}">
+        <p14:creationId xmlns:p14="http://schemas.microsoft.com/office/powerpoint/2010/main" val="2737212266"/>
       </p:ext>
     </p:extLst>
   </p:cSld>

</xml_diff>